<commit_message>
Hands On Demos - Day 6.
</commit_message>
<xml_diff>
--- a/3. Spring 5.0 (Core, MVC, REST, Data JPA, Data REST)/Day 6/Slides/5. Testing/testing-slides.pptx
+++ b/3. Spring 5.0 (Core, MVC, REST, Data JPA, Data REST)/Day 6/Slides/5. Testing/testing-slides.pptx
@@ -12754,7 +12754,7 @@
                 <a:latin typeface="Verdana" panose="020B0604030504040204"/>
                 <a:cs typeface="Verdana" panose="020B0604030504040204"/>
               </a:rPr>
-              <a:t>Postgres</a:t>
+              <a:t>My</a:t>
             </a:r>
             <a:r>
               <a:rPr sz="3200" spc="65" dirty="0">
@@ -13083,54 +13083,6 @@
           </a:graphicData>
         </a:graphic>
       </p:graphicFrame>
-      <p:sp>
-        <p:nvSpPr>
-          <p:cNvPr id="21" name="object 21"/>
-          <p:cNvSpPr/>
-          <p:nvPr/>
-        </p:nvSpPr>
-        <p:spPr>
-          <a:xfrm>
-            <a:off x="9009580" y="2206691"/>
-            <a:ext cx="2955290" cy="5156835"/>
-          </a:xfrm>
-          <a:custGeom>
-            <a:avLst/>
-            <a:gdLst/>
-            <a:ahLst/>
-            <a:cxnLst/>
-            <a:rect l="l" t="t" r="r" b="b"/>
-            <a:pathLst>
-              <a:path w="2955290" h="5156834">
-                <a:moveTo>
-                  <a:pt x="0" y="0"/>
-                </a:moveTo>
-                <a:lnTo>
-                  <a:pt x="2955240" y="0"/>
-                </a:lnTo>
-                <a:lnTo>
-                  <a:pt x="2955240" y="5156266"/>
-                </a:lnTo>
-                <a:lnTo>
-                  <a:pt x="0" y="5156266"/>
-                </a:lnTo>
-                <a:lnTo>
-                  <a:pt x="0" y="0"/>
-                </a:lnTo>
-                <a:close/>
-              </a:path>
-            </a:pathLst>
-          </a:custGeom>
-          <a:solidFill>
-            <a:srgbClr val="FFFFFF"/>
-          </a:solidFill>
-        </p:spPr>
-        <p:txBody>
-          <a:bodyPr wrap="square" lIns="0" tIns="0" rIns="0" bIns="0" rtlCol="0"/>
-          <a:lstStyle/>
-          <a:p/>
-        </p:txBody>
-      </p:sp>
       <p:grpSp>
         <p:nvGrpSpPr>
           <p:cNvPr id="22" name="object 22"/>

</xml_diff>